<commit_message>
realizing prototype of slidebox and fixing bugs
</commit_message>
<xml_diff>
--- a/WebPresentation.pptx
+++ b/WebPresentation.pptx
@@ -7,6 +7,8 @@
   <p:sldIdLst>
     <p:sldId id="256" r:id="rId2"/>
     <p:sldId id="257" r:id="rId3"/>
+    <p:sldId id="258" r:id="rId4"/>
+    <p:sldId id="259" r:id="rId5"/>
   </p:sldIdLst>
   <p:sldSz cx="12192000" cy="6858000"/>
   <p:notesSz cx="6858000" cy="9144000"/>
@@ -105,6 +107,11 @@
       </a:defRPr>
     </a:lvl9pPr>
   </p:defaultTextStyle>
+  <p:extLst>
+    <p:ext uri="{EFAFB233-063F-42B5-8137-9DF3F51BA10A}">
+      <p15:sldGuideLst xmlns:p15="http://schemas.microsoft.com/office/powerpoint/2012/main"/>
+    </p:ext>
+  </p:extLst>
 </p:presentation>
 </file>
 
@@ -5374,56 +5381,86 @@
             <p:ph type="ctrTitle"/>
           </p:nvPr>
         </p:nvSpPr>
-        <p:spPr/>
-        <p:txBody>
-          <a:bodyPr/>
-          <a:lstStyle/>
-          <a:p>
-            <a:r>
-              <a:rPr lang="en-US" dirty="0" smtClean="0"/>
+        <p:spPr>
+          <a:xfrm>
+            <a:off x="0" y="1"/>
+            <a:ext cx="12820261" cy="6858000"/>
+          </a:xfrm>
+          <a:noFill/>
+          <a:ln>
+            <a:noFill/>
+          </a:ln>
+          <a:effectLst>
+            <a:outerShdw blurRad="225425" dist="50800" dir="5220000" algn="ctr">
+              <a:srgbClr val="000000">
+                <a:alpha val="33000"/>
+              </a:srgbClr>
+            </a:outerShdw>
+          </a:effectLst>
+          <a:scene3d>
+            <a:camera prst="orthographicFront"/>
+            <a:lightRig rig="harsh" dir="t">
+              <a:rot lat="0" lon="0" rev="3000000"/>
+            </a:lightRig>
+          </a:scene3d>
+          <a:sp3d extrusionH="254000" contourW="19050">
+            <a:bevelB w="82550" h="44450" prst="angle"/>
+            <a:contourClr>
+              <a:srgbClr val="FFFFFF"/>
+            </a:contourClr>
+          </a:sp3d>
+        </p:spPr>
+        <p:style>
+          <a:lnRef idx="0">
+            <a:scrgbClr r="0" g="0" b="0"/>
+          </a:lnRef>
+          <a:fillRef idx="1002">
+            <a:schemeClr val="lt2"/>
+          </a:fillRef>
+          <a:effectRef idx="0">
+            <a:scrgbClr r="0" g="0" b="0"/>
+          </a:effectRef>
+          <a:fontRef idx="major"/>
+        </p:style>
+        <p:txBody>
+          <a:bodyPr anchor="ctr">
+            <a:noAutofit/>
+            <a:sp3d/>
+          </a:bodyPr>
+          <a:lstStyle/>
+          <a:p>
+            <a:r>
+              <a:rPr lang="en-US" sz="16600" b="1" dirty="0" smtClean="0">
+                <a:solidFill>
+                  <a:schemeClr val="tx1">
+                    <a:lumMod val="95000"/>
+                  </a:schemeClr>
+                </a:solidFill>
+                <a:effectLst>
+                  <a:outerShdw blurRad="60007" dist="200025" dir="15000000" sy="30000" kx="-1800000" algn="bl" rotWithShape="0">
+                    <a:prstClr val="black">
+                      <a:alpha val="32000"/>
+                    </a:prstClr>
+                  </a:outerShdw>
+                </a:effectLst>
+              </a:rPr>
               <a:t>Who we are?</a:t>
             </a:r>
-            <a:endParaRPr lang="ru-RU" dirty="0"/>
-          </a:p>
-        </p:txBody>
-      </p:sp>
-      <p:sp>
-        <p:nvSpPr>
-          <p:cNvPr id="3" name="Подзаголовок 2"/>
-          <p:cNvSpPr>
-            <a:spLocks noGrp="1"/>
-          </p:cNvSpPr>
-          <p:nvPr>
-            <p:ph type="subTitle" idx="1"/>
-          </p:nvPr>
-        </p:nvSpPr>
-        <p:spPr/>
-        <p:txBody>
-          <a:bodyPr/>
-          <a:lstStyle/>
-          <a:p>
-            <a:r>
-              <a:rPr lang="en-US" dirty="0" smtClean="0"/>
-              <a:t>We are group of young man that decide to simplify selling/buying air-tickets.</a:t>
-            </a:r>
-            <a:endParaRPr lang="ru-RU" dirty="0" smtClean="0"/>
-          </a:p>
-          <a:p>
-            <a:r>
-              <a:rPr lang="en-US" dirty="0" smtClean="0"/>
-              <a:t>We work in about 15 countries in the world.</a:t>
-            </a:r>
-          </a:p>
-          <a:p>
-            <a:r>
-              <a:rPr lang="en-US" dirty="0" smtClean="0"/>
-              <a:t>Our company counts near </a:t>
-            </a:r>
-            <a:r>
-              <a:rPr lang="en-US" dirty="0"/>
-              <a:t>500 employees.</a:t>
-            </a:r>
-            <a:endParaRPr lang="ru-RU" dirty="0"/>
+            <a:endParaRPr lang="ru-RU" sz="16600" b="1" dirty="0">
+              <a:solidFill>
+                <a:schemeClr val="tx1">
+                  <a:lumMod val="95000"/>
+                </a:schemeClr>
+              </a:solidFill>
+              <a:effectLst>
+                <a:outerShdw blurRad="60007" dist="200025" dir="15000000" sy="30000" kx="-1800000" algn="bl" rotWithShape="0">
+                  <a:prstClr val="black">
+                    <a:alpha val="32000"/>
+                  </a:prstClr>
+                </a:outerShdw>
+              </a:effectLst>
+              <a:hlinkMouseOver r:id="" action="ppaction://hlinkshowjump?jump=nextslide"/>
+            </a:endParaRPr>
           </a:p>
         </p:txBody>
       </p:sp>
@@ -5437,6 +5474,21 @@
   <p:clrMapOvr>
     <a:masterClrMapping/>
   </p:clrMapOvr>
+  <mc:AlternateContent xmlns:mc="http://schemas.openxmlformats.org/markup-compatibility/2006">
+    <mc:Choice xmlns:p14="http://schemas.microsoft.com/office/powerpoint/2010/main" Requires="p14">
+      <p:transition p14:dur="10"/>
+    </mc:Choice>
+    <mc:Fallback>
+      <p:transition/>
+    </mc:Fallback>
+  </mc:AlternateContent>
+  <p:timing>
+    <p:tnLst>
+      <p:par>
+        <p:cTn id="1" dur="indefinite" restart="never" nodeType="tmRoot"/>
+      </p:par>
+    </p:tnLst>
+  </p:timing>
 </p:sld>
 </file>
 
@@ -5467,34 +5519,71 @@
             <p:ph type="title"/>
           </p:nvPr>
         </p:nvSpPr>
-        <p:spPr/>
-        <p:txBody>
-          <a:bodyPr/>
-          <a:lstStyle/>
-          <a:p>
-            <a:endParaRPr lang="ru-RU"/>
-          </a:p>
-        </p:txBody>
-      </p:sp>
-      <p:sp>
-        <p:nvSpPr>
-          <p:cNvPr id="3" name="Объект 2"/>
-          <p:cNvSpPr>
-            <a:spLocks noGrp="1"/>
-          </p:cNvSpPr>
+        <p:spPr>
+          <a:xfrm>
+            <a:off x="291020" y="1289304"/>
+            <a:ext cx="4436428" cy="4558791"/>
+          </a:xfrm>
+          <a:scene3d>
+            <a:camera prst="perspectiveRight"/>
+            <a:lightRig rig="threePt" dir="t"/>
+          </a:scene3d>
+        </p:spPr>
+        <p:txBody>
+          <a:bodyPr>
+            <a:normAutofit/>
+          </a:bodyPr>
+          <a:lstStyle/>
+          <a:p>
+            <a:r>
+              <a:rPr lang="en-US" dirty="0">
+                <a:latin typeface="Bookman Old Style" panose="02050604050505020204" pitchFamily="18" charset="0"/>
+              </a:rPr>
+              <a:t>We are group of young man that decide to simplify selling/buying air-tickets.</a:t>
+            </a:r>
+            <a:r>
+              <a:rPr lang="ru-RU" b="1" dirty="0"/>
+              <a:t/>
+            </a:r>
+            <a:br>
+              <a:rPr lang="ru-RU" b="1" dirty="0"/>
+            </a:br>
+            <a:endParaRPr lang="ru-RU" b="1" dirty="0"/>
+          </a:p>
+        </p:txBody>
+      </p:sp>
+      <p:pic>
+        <p:nvPicPr>
+          <p:cNvPr id="4" name="Объект 3"/>
+          <p:cNvPicPr>
+            <a:picLocks noGrp="1" noChangeAspect="1"/>
+          </p:cNvPicPr>
           <p:nvPr>
             <p:ph idx="1"/>
           </p:nvPr>
-        </p:nvSpPr>
-        <p:spPr/>
-        <p:txBody>
-          <a:bodyPr/>
-          <a:lstStyle/>
-          <a:p>
-            <a:endParaRPr lang="ru-RU"/>
-          </a:p>
-        </p:txBody>
-      </p:sp>
+        </p:nvPicPr>
+        <p:blipFill>
+          <a:blip r:embed="rId2">
+            <a:extLst>
+              <a:ext uri="{28A0092B-C50C-407E-A947-70E740481C1C}">
+                <a14:useLocalDpi xmlns:a14="http://schemas.microsoft.com/office/drawing/2010/main" val="0"/>
+              </a:ext>
+            </a:extLst>
+          </a:blip>
+          <a:stretch>
+            <a:fillRect/>
+          </a:stretch>
+        </p:blipFill>
+        <p:spPr>
+          <a:xfrm>
+            <a:off x="4869937" y="283464"/>
+            <a:ext cx="6435735" cy="3614738"/>
+          </a:xfrm>
+          <a:effectLst>
+            <a:reflection blurRad="6350" stA="50000" endA="300" endPos="55000" dir="5400000" sy="-100000" algn="bl" rotWithShape="0"/>
+          </a:effectLst>
+        </p:spPr>
+      </p:pic>
     </p:spTree>
     <p:extLst>
       <p:ext uri="{BB962C8B-B14F-4D97-AF65-F5344CB8AC3E}">
@@ -5505,6 +5594,256 @@
   <p:clrMapOvr>
     <a:masterClrMapping/>
   </p:clrMapOvr>
+  <p:transition spd="slow">
+    <p:cover/>
+  </p:transition>
+  <p:timing>
+    <p:tnLst>
+      <p:par>
+        <p:cTn id="1" dur="indefinite" restart="never" nodeType="tmRoot"/>
+      </p:par>
+    </p:tnLst>
+  </p:timing>
+</p:sld>
+</file>
+
+<file path=ppt/slides/slide3.xml><?xml version="1.0" encoding="utf-8"?>
+<p:sld xmlns:a="http://schemas.openxmlformats.org/drawingml/2006/main" xmlns:r="http://schemas.openxmlformats.org/officeDocument/2006/relationships" xmlns:p="http://schemas.openxmlformats.org/presentationml/2006/main">
+  <p:cSld>
+    <p:spTree>
+      <p:nvGrpSpPr>
+        <p:cNvPr id="1" name=""/>
+        <p:cNvGrpSpPr/>
+        <p:nvPr/>
+      </p:nvGrpSpPr>
+      <p:grpSpPr>
+        <a:xfrm>
+          <a:off x="0" y="0"/>
+          <a:ext cx="0" cy="0"/>
+          <a:chOff x="0" y="0"/>
+          <a:chExt cx="0" cy="0"/>
+        </a:xfrm>
+      </p:grpSpPr>
+      <p:sp>
+        <p:nvSpPr>
+          <p:cNvPr id="2" name="Заголовок 1"/>
+          <p:cNvSpPr>
+            <a:spLocks noGrp="1"/>
+          </p:cNvSpPr>
+          <p:nvPr>
+            <p:ph type="title"/>
+          </p:nvPr>
+        </p:nvSpPr>
+        <p:spPr>
+          <a:xfrm>
+            <a:off x="7567148" y="1156058"/>
+            <a:ext cx="4317556" cy="4915407"/>
+          </a:xfrm>
+          <a:scene3d>
+            <a:camera prst="perspectiveLeft"/>
+            <a:lightRig rig="threePt" dir="t"/>
+          </a:scene3d>
+        </p:spPr>
+        <p:txBody>
+          <a:bodyPr>
+            <a:normAutofit/>
+          </a:bodyPr>
+          <a:lstStyle/>
+          <a:p>
+            <a:pPr algn="r"/>
+            <a:r>
+              <a:rPr lang="en-US" dirty="0">
+                <a:latin typeface="Bookman Old Style" panose="02050604050505020204" pitchFamily="18" charset="0"/>
+              </a:rPr>
+              <a:t>We work in about 15 countries in the world.</a:t>
+            </a:r>
+            <a:br>
+              <a:rPr lang="en-US" dirty="0">
+                <a:latin typeface="Bookman Old Style" panose="02050604050505020204" pitchFamily="18" charset="0"/>
+              </a:rPr>
+            </a:br>
+            <a:r>
+              <a:rPr lang="en-US" dirty="0">
+                <a:latin typeface="Bookman Old Style" panose="02050604050505020204" pitchFamily="18" charset="0"/>
+              </a:rPr>
+              <a:t>Our </a:t>
+            </a:r>
+            <a:r>
+              <a:rPr lang="en-US" dirty="0" smtClean="0">
+                <a:latin typeface="Bookman Old Style" panose="02050604050505020204" pitchFamily="18" charset="0"/>
+              </a:rPr>
+              <a:t>company </a:t>
+            </a:r>
+            <a:r>
+              <a:rPr lang="en-US" dirty="0">
+                <a:latin typeface="Bookman Old Style" panose="02050604050505020204" pitchFamily="18" charset="0"/>
+              </a:rPr>
+              <a:t>counts near 500 employees.</a:t>
+            </a:r>
+            <a:r>
+              <a:rPr lang="ru-RU" dirty="0"/>
+              <a:t/>
+            </a:r>
+            <a:br>
+              <a:rPr lang="ru-RU" dirty="0"/>
+            </a:br>
+            <a:endParaRPr lang="ru-RU" dirty="0"/>
+          </a:p>
+        </p:txBody>
+      </p:sp>
+      <p:pic>
+        <p:nvPicPr>
+          <p:cNvPr id="4" name="Объект 3"/>
+          <p:cNvPicPr>
+            <a:picLocks noGrp="1" noChangeAspect="1"/>
+          </p:cNvPicPr>
+          <p:nvPr>
+            <p:ph idx="1"/>
+          </p:nvPr>
+        </p:nvPicPr>
+        <p:blipFill>
+          <a:blip r:embed="rId2" cstate="print">
+            <a:extLst>
+              <a:ext uri="{28A0092B-C50C-407E-A947-70E740481C1C}">
+                <a14:useLocalDpi xmlns:a14="http://schemas.microsoft.com/office/drawing/2010/main" val="0"/>
+              </a:ext>
+            </a:extLst>
+          </a:blip>
+          <a:stretch>
+            <a:fillRect/>
+          </a:stretch>
+        </p:blipFill>
+        <p:spPr>
+          <a:xfrm>
+            <a:off x="501332" y="1449776"/>
+            <a:ext cx="7065816" cy="3614738"/>
+          </a:xfrm>
+          <a:effectLst>
+            <a:softEdge rad="127000"/>
+          </a:effectLst>
+        </p:spPr>
+      </p:pic>
+    </p:spTree>
+    <p:extLst>
+      <p:ext uri="{BB962C8B-B14F-4D97-AF65-F5344CB8AC3E}">
+        <p14:creationId xmlns:p14="http://schemas.microsoft.com/office/powerpoint/2010/main" val="1681042211"/>
+      </p:ext>
+    </p:extLst>
+  </p:cSld>
+  <p:clrMapOvr>
+    <a:masterClrMapping/>
+  </p:clrMapOvr>
+  <p:transition spd="slow">
+    <p:cover/>
+  </p:transition>
+  <p:timing>
+    <p:tnLst>
+      <p:par>
+        <p:cTn id="1" dur="indefinite" restart="never" nodeType="tmRoot"/>
+      </p:par>
+    </p:tnLst>
+  </p:timing>
+</p:sld>
+</file>
+
+<file path=ppt/slides/slide4.xml><?xml version="1.0" encoding="utf-8"?>
+<p:sld xmlns:a="http://schemas.openxmlformats.org/drawingml/2006/main" xmlns:r="http://schemas.openxmlformats.org/officeDocument/2006/relationships" xmlns:p="http://schemas.openxmlformats.org/presentationml/2006/main">
+  <p:cSld>
+    <p:spTree>
+      <p:nvGrpSpPr>
+        <p:cNvPr id="1" name=""/>
+        <p:cNvGrpSpPr/>
+        <p:nvPr/>
+      </p:nvGrpSpPr>
+      <p:grpSpPr>
+        <a:xfrm>
+          <a:off x="0" y="0"/>
+          <a:ext cx="0" cy="0"/>
+          <a:chOff x="0" y="0"/>
+          <a:chExt cx="0" cy="0"/>
+        </a:xfrm>
+      </p:grpSpPr>
+      <p:sp>
+        <p:nvSpPr>
+          <p:cNvPr id="2" name="Заголовок 1"/>
+          <p:cNvSpPr>
+            <a:spLocks noGrp="1"/>
+          </p:cNvSpPr>
+          <p:nvPr>
+            <p:ph type="title"/>
+          </p:nvPr>
+        </p:nvSpPr>
+        <p:spPr>
+          <a:xfrm>
+            <a:off x="1676024" y="5641848"/>
+            <a:ext cx="9991720" cy="1477263"/>
+          </a:xfrm>
+        </p:spPr>
+        <p:txBody>
+          <a:bodyPr/>
+          <a:lstStyle/>
+          <a:p>
+            <a:r>
+              <a:rPr lang="en-US" dirty="0" smtClean="0">
+                <a:latin typeface="Bookman Old Style" panose="02050604050505020204" pitchFamily="18" charset="0"/>
+              </a:rPr>
+              <a:t>We are – decision for your trips!</a:t>
+            </a:r>
+            <a:endParaRPr lang="ru-RU" dirty="0">
+              <a:latin typeface="Bookman Old Style" panose="02050604050505020204" pitchFamily="18" charset="0"/>
+            </a:endParaRPr>
+          </a:p>
+        </p:txBody>
+      </p:sp>
+      <p:pic>
+        <p:nvPicPr>
+          <p:cNvPr id="4" name="Объект 3"/>
+          <p:cNvPicPr>
+            <a:picLocks noGrp="1" noChangeAspect="1"/>
+          </p:cNvPicPr>
+          <p:nvPr>
+            <p:ph idx="1"/>
+          </p:nvPr>
+        </p:nvPicPr>
+        <p:blipFill>
+          <a:blip r:embed="rId2">
+            <a:extLst>
+              <a:ext uri="{28A0092B-C50C-407E-A947-70E740481C1C}">
+                <a14:useLocalDpi xmlns:a14="http://schemas.microsoft.com/office/drawing/2010/main" val="0"/>
+              </a:ext>
+            </a:extLst>
+          </a:blip>
+          <a:stretch>
+            <a:fillRect/>
+          </a:stretch>
+        </p:blipFill>
+        <p:spPr>
+          <a:xfrm>
+            <a:off x="1566296" y="411480"/>
+            <a:ext cx="9401669" cy="5440134"/>
+          </a:xfrm>
+        </p:spPr>
+      </p:pic>
+    </p:spTree>
+    <p:extLst>
+      <p:ext uri="{BB962C8B-B14F-4D97-AF65-F5344CB8AC3E}">
+        <p14:creationId xmlns:p14="http://schemas.microsoft.com/office/powerpoint/2010/main" val="1166942552"/>
+      </p:ext>
+    </p:extLst>
+  </p:cSld>
+  <p:clrMapOvr>
+    <a:masterClrMapping/>
+  </p:clrMapOvr>
+  <p:transition spd="slow">
+    <p:cover/>
+  </p:transition>
+  <p:timing>
+    <p:tnLst>
+      <p:par>
+        <p:cTn id="1" dur="indefinite" restart="never" nodeType="tmRoot"/>
+      </p:par>
+    </p:tnLst>
+  </p:timing>
 </p:sld>
 </file>
 

</xml_diff>